<commit_message>
More info dumped (need re-organization asap)
</commit_message>
<xml_diff>
--- a/AcademicRepositories/trunk/Paper/database_flowchart.pptx
+++ b/AcademicRepositories/trunk/Paper/database_flowchart.pptx
@@ -7,14 +7,14 @@
   <p:sldIdLst>
     <p:sldId id="256" r:id="rId2"/>
   </p:sldIdLst>
-  <p:sldSz cx="9144000" cy="6858000" type="screen4x3"/>
+  <p:sldSz cx="7200900" cy="4321175"/>
   <p:notesSz cx="6858000" cy="9144000"/>
   <p:defaultTextStyle>
     <a:defPPr>
       <a:defRPr lang="de-DE"/>
     </a:defPPr>
-    <a:lvl1pPr marL="0" algn="l" defTabSz="914400" rtl="0" eaLnBrk="1" latinLnBrk="0" hangingPunct="1">
-      <a:defRPr sz="1800" kern="1200">
+    <a:lvl1pPr marL="0" algn="l" defTabSz="658368" rtl="0" eaLnBrk="1" latinLnBrk="0" hangingPunct="1">
+      <a:defRPr sz="1300" kern="1200">
         <a:solidFill>
           <a:schemeClr val="tx1"/>
         </a:solidFill>
@@ -23,8 +23,8 @@
         <a:cs typeface="+mn-cs"/>
       </a:defRPr>
     </a:lvl1pPr>
-    <a:lvl2pPr marL="457200" algn="l" defTabSz="914400" rtl="0" eaLnBrk="1" latinLnBrk="0" hangingPunct="1">
-      <a:defRPr sz="1800" kern="1200">
+    <a:lvl2pPr marL="329184" algn="l" defTabSz="658368" rtl="0" eaLnBrk="1" latinLnBrk="0" hangingPunct="1">
+      <a:defRPr sz="1300" kern="1200">
         <a:solidFill>
           <a:schemeClr val="tx1"/>
         </a:solidFill>
@@ -33,8 +33,8 @@
         <a:cs typeface="+mn-cs"/>
       </a:defRPr>
     </a:lvl2pPr>
-    <a:lvl3pPr marL="914400" algn="l" defTabSz="914400" rtl="0" eaLnBrk="1" latinLnBrk="0" hangingPunct="1">
-      <a:defRPr sz="1800" kern="1200">
+    <a:lvl3pPr marL="658368" algn="l" defTabSz="658368" rtl="0" eaLnBrk="1" latinLnBrk="0" hangingPunct="1">
+      <a:defRPr sz="1300" kern="1200">
         <a:solidFill>
           <a:schemeClr val="tx1"/>
         </a:solidFill>
@@ -43,8 +43,8 @@
         <a:cs typeface="+mn-cs"/>
       </a:defRPr>
     </a:lvl3pPr>
-    <a:lvl4pPr marL="1371600" algn="l" defTabSz="914400" rtl="0" eaLnBrk="1" latinLnBrk="0" hangingPunct="1">
-      <a:defRPr sz="1800" kern="1200">
+    <a:lvl4pPr marL="987552" algn="l" defTabSz="658368" rtl="0" eaLnBrk="1" latinLnBrk="0" hangingPunct="1">
+      <a:defRPr sz="1300" kern="1200">
         <a:solidFill>
           <a:schemeClr val="tx1"/>
         </a:solidFill>
@@ -53,8 +53,8 @@
         <a:cs typeface="+mn-cs"/>
       </a:defRPr>
     </a:lvl4pPr>
-    <a:lvl5pPr marL="1828800" algn="l" defTabSz="914400" rtl="0" eaLnBrk="1" latinLnBrk="0" hangingPunct="1">
-      <a:defRPr sz="1800" kern="1200">
+    <a:lvl5pPr marL="1316736" algn="l" defTabSz="658368" rtl="0" eaLnBrk="1" latinLnBrk="0" hangingPunct="1">
+      <a:defRPr sz="1300" kern="1200">
         <a:solidFill>
           <a:schemeClr val="tx1"/>
         </a:solidFill>
@@ -63,8 +63,8 @@
         <a:cs typeface="+mn-cs"/>
       </a:defRPr>
     </a:lvl5pPr>
-    <a:lvl6pPr marL="2286000" algn="l" defTabSz="914400" rtl="0" eaLnBrk="1" latinLnBrk="0" hangingPunct="1">
-      <a:defRPr sz="1800" kern="1200">
+    <a:lvl6pPr marL="1645920" algn="l" defTabSz="658368" rtl="0" eaLnBrk="1" latinLnBrk="0" hangingPunct="1">
+      <a:defRPr sz="1300" kern="1200">
         <a:solidFill>
           <a:schemeClr val="tx1"/>
         </a:solidFill>
@@ -73,8 +73,8 @@
         <a:cs typeface="+mn-cs"/>
       </a:defRPr>
     </a:lvl6pPr>
-    <a:lvl7pPr marL="2743200" algn="l" defTabSz="914400" rtl="0" eaLnBrk="1" latinLnBrk="0" hangingPunct="1">
-      <a:defRPr sz="1800" kern="1200">
+    <a:lvl7pPr marL="1975104" algn="l" defTabSz="658368" rtl="0" eaLnBrk="1" latinLnBrk="0" hangingPunct="1">
+      <a:defRPr sz="1300" kern="1200">
         <a:solidFill>
           <a:schemeClr val="tx1"/>
         </a:solidFill>
@@ -83,8 +83,8 @@
         <a:cs typeface="+mn-cs"/>
       </a:defRPr>
     </a:lvl7pPr>
-    <a:lvl8pPr marL="3200400" algn="l" defTabSz="914400" rtl="0" eaLnBrk="1" latinLnBrk="0" hangingPunct="1">
-      <a:defRPr sz="1800" kern="1200">
+    <a:lvl8pPr marL="2304288" algn="l" defTabSz="658368" rtl="0" eaLnBrk="1" latinLnBrk="0" hangingPunct="1">
+      <a:defRPr sz="1300" kern="1200">
         <a:solidFill>
           <a:schemeClr val="tx1"/>
         </a:solidFill>
@@ -93,8 +93,8 @@
         <a:cs typeface="+mn-cs"/>
       </a:defRPr>
     </a:lvl8pPr>
-    <a:lvl9pPr marL="3657600" algn="l" defTabSz="914400" rtl="0" eaLnBrk="1" latinLnBrk="0" hangingPunct="1">
-      <a:defRPr sz="1800" kern="1200">
+    <a:lvl9pPr marL="2633472" algn="l" defTabSz="658368" rtl="0" eaLnBrk="1" latinLnBrk="0" hangingPunct="1">
+      <a:defRPr sz="1300" kern="1200">
         <a:solidFill>
           <a:schemeClr val="tx1"/>
         </a:solidFill>
@@ -136,8 +136,8 @@
         </p:nvSpPr>
         <p:spPr>
           <a:xfrm>
-            <a:off x="685800" y="2130425"/>
-            <a:ext cx="7772400" cy="1470025"/>
+            <a:off x="540068" y="1342365"/>
+            <a:ext cx="6120765" cy="926252"/>
           </a:xfrm>
         </p:spPr>
         <p:txBody>
@@ -164,8 +164,8 @@
         </p:nvSpPr>
         <p:spPr>
           <a:xfrm>
-            <a:off x="1371600" y="3886200"/>
-            <a:ext cx="6400800" cy="1752600"/>
+            <a:off x="1080135" y="2448666"/>
+            <a:ext cx="5040630" cy="1104300"/>
           </a:xfrm>
         </p:spPr>
         <p:txBody>
@@ -181,7 +181,7 @@
                 </a:solidFill>
               </a:defRPr>
             </a:lvl1pPr>
-            <a:lvl2pPr marL="457200" indent="0" algn="ctr">
+            <a:lvl2pPr marL="329184" indent="0" algn="ctr">
               <a:buNone/>
               <a:defRPr>
                 <a:solidFill>
@@ -191,7 +191,7 @@
                 </a:solidFill>
               </a:defRPr>
             </a:lvl2pPr>
-            <a:lvl3pPr marL="914400" indent="0" algn="ctr">
+            <a:lvl3pPr marL="658368" indent="0" algn="ctr">
               <a:buNone/>
               <a:defRPr>
                 <a:solidFill>
@@ -201,7 +201,7 @@
                 </a:solidFill>
               </a:defRPr>
             </a:lvl3pPr>
-            <a:lvl4pPr marL="1371600" indent="0" algn="ctr">
+            <a:lvl4pPr marL="987552" indent="0" algn="ctr">
               <a:buNone/>
               <a:defRPr>
                 <a:solidFill>
@@ -211,7 +211,7 @@
                 </a:solidFill>
               </a:defRPr>
             </a:lvl4pPr>
-            <a:lvl5pPr marL="1828800" indent="0" algn="ctr">
+            <a:lvl5pPr marL="1316736" indent="0" algn="ctr">
               <a:buNone/>
               <a:defRPr>
                 <a:solidFill>
@@ -221,7 +221,7 @@
                 </a:solidFill>
               </a:defRPr>
             </a:lvl5pPr>
-            <a:lvl6pPr marL="2286000" indent="0" algn="ctr">
+            <a:lvl6pPr marL="1645920" indent="0" algn="ctr">
               <a:buNone/>
               <a:defRPr>
                 <a:solidFill>
@@ -231,7 +231,7 @@
                 </a:solidFill>
               </a:defRPr>
             </a:lvl6pPr>
-            <a:lvl7pPr marL="2743200" indent="0" algn="ctr">
+            <a:lvl7pPr marL="1975104" indent="0" algn="ctr">
               <a:buNone/>
               <a:defRPr>
                 <a:solidFill>
@@ -241,7 +241,7 @@
                 </a:solidFill>
               </a:defRPr>
             </a:lvl7pPr>
-            <a:lvl8pPr marL="3200400" indent="0" algn="ctr">
+            <a:lvl8pPr marL="2304288" indent="0" algn="ctr">
               <a:buNone/>
               <a:defRPr>
                 <a:solidFill>
@@ -251,7 +251,7 @@
                 </a:solidFill>
               </a:defRPr>
             </a:lvl8pPr>
-            <a:lvl9pPr marL="3657600" indent="0" algn="ctr">
+            <a:lvl9pPr marL="2633472" indent="0" algn="ctr">
               <a:buNone/>
               <a:defRPr>
                 <a:solidFill>
@@ -288,7 +288,7 @@
           <a:p>
             <a:fld id="{DB1027F9-481E-4E2A-88FE-95C505FB87A8}" type="datetimeFigureOut">
               <a:rPr lang="de-DE" smtClean="0"/>
-              <a:t>06.06.2016</a:t>
+              <a:t>15.06.2016</a:t>
             </a:fld>
             <a:endParaRPr lang="de-DE"/>
           </a:p>
@@ -458,7 +458,7 @@
           <a:p>
             <a:fld id="{DB1027F9-481E-4E2A-88FE-95C505FB87A8}" type="datetimeFigureOut">
               <a:rPr lang="de-DE" smtClean="0"/>
-              <a:t>06.06.2016</a:t>
+              <a:t>15.06.2016</a:t>
             </a:fld>
             <a:endParaRPr lang="de-DE"/>
           </a:p>
@@ -548,8 +548,8 @@
         </p:nvSpPr>
         <p:spPr>
           <a:xfrm>
-            <a:off x="6629400" y="274638"/>
-            <a:ext cx="2057400" cy="5851525"/>
+            <a:off x="5220652" y="173047"/>
+            <a:ext cx="1620203" cy="3687003"/>
           </a:xfrm>
         </p:spPr>
         <p:txBody>
@@ -576,8 +576,8 @@
         </p:nvSpPr>
         <p:spPr>
           <a:xfrm>
-            <a:off x="457200" y="274638"/>
-            <a:ext cx="6019800" cy="5851525"/>
+            <a:off x="360045" y="173047"/>
+            <a:ext cx="4740593" cy="3687003"/>
           </a:xfrm>
         </p:spPr>
         <p:txBody>
@@ -638,7 +638,7 @@
           <a:p>
             <a:fld id="{DB1027F9-481E-4E2A-88FE-95C505FB87A8}" type="datetimeFigureOut">
               <a:rPr lang="de-DE" smtClean="0"/>
-              <a:t>06.06.2016</a:t>
+              <a:t>15.06.2016</a:t>
             </a:fld>
             <a:endParaRPr lang="de-DE"/>
           </a:p>
@@ -808,7 +808,7 @@
           <a:p>
             <a:fld id="{DB1027F9-481E-4E2A-88FE-95C505FB87A8}" type="datetimeFigureOut">
               <a:rPr lang="de-DE" smtClean="0"/>
-              <a:t>06.06.2016</a:t>
+              <a:t>15.06.2016</a:t>
             </a:fld>
             <a:endParaRPr lang="de-DE"/>
           </a:p>
@@ -898,15 +898,15 @@
         </p:nvSpPr>
         <p:spPr>
           <a:xfrm>
-            <a:off x="722313" y="4406900"/>
-            <a:ext cx="7772400" cy="1362075"/>
+            <a:off x="568821" y="2776756"/>
+            <a:ext cx="6120765" cy="858233"/>
           </a:xfrm>
         </p:spPr>
         <p:txBody>
           <a:bodyPr anchor="t"/>
           <a:lstStyle>
             <a:lvl1pPr algn="l">
-              <a:defRPr sz="4000" b="1" cap="all"/>
+              <a:defRPr sz="2900" b="1" cap="all"/>
             </a:lvl1pPr>
           </a:lstStyle>
           <a:p>
@@ -930,8 +930,8 @@
         </p:nvSpPr>
         <p:spPr>
           <a:xfrm>
-            <a:off x="722313" y="2906713"/>
-            <a:ext cx="7772400" cy="1500187"/>
+            <a:off x="568821" y="1831499"/>
+            <a:ext cx="6120765" cy="945257"/>
           </a:xfrm>
         </p:spPr>
         <p:txBody>
@@ -939,7 +939,7 @@
           <a:lstStyle>
             <a:lvl1pPr marL="0" indent="0">
               <a:buNone/>
-              <a:defRPr sz="2000">
+              <a:defRPr sz="1400">
                 <a:solidFill>
                   <a:schemeClr val="tx1">
                     <a:tint val="75000"/>
@@ -947,9 +947,9 @@
                 </a:solidFill>
               </a:defRPr>
             </a:lvl1pPr>
-            <a:lvl2pPr marL="457200" indent="0">
-              <a:buNone/>
-              <a:defRPr sz="1800">
+            <a:lvl2pPr marL="329184" indent="0">
+              <a:buNone/>
+              <a:defRPr sz="1300">
                 <a:solidFill>
                   <a:schemeClr val="tx1">
                     <a:tint val="75000"/>
@@ -957,9 +957,9 @@
                 </a:solidFill>
               </a:defRPr>
             </a:lvl2pPr>
-            <a:lvl3pPr marL="914400" indent="0">
-              <a:buNone/>
-              <a:defRPr sz="1600">
+            <a:lvl3pPr marL="658368" indent="0">
+              <a:buNone/>
+              <a:defRPr sz="1200">
                 <a:solidFill>
                   <a:schemeClr val="tx1">
                     <a:tint val="75000"/>
@@ -967,9 +967,9 @@
                 </a:solidFill>
               </a:defRPr>
             </a:lvl3pPr>
-            <a:lvl4pPr marL="1371600" indent="0">
-              <a:buNone/>
-              <a:defRPr sz="1400">
+            <a:lvl4pPr marL="987552" indent="0">
+              <a:buNone/>
+              <a:defRPr sz="1000">
                 <a:solidFill>
                   <a:schemeClr val="tx1">
                     <a:tint val="75000"/>
@@ -977,9 +977,9 @@
                 </a:solidFill>
               </a:defRPr>
             </a:lvl4pPr>
-            <a:lvl5pPr marL="1828800" indent="0">
-              <a:buNone/>
-              <a:defRPr sz="1400">
+            <a:lvl5pPr marL="1316736" indent="0">
+              <a:buNone/>
+              <a:defRPr sz="1000">
                 <a:solidFill>
                   <a:schemeClr val="tx1">
                     <a:tint val="75000"/>
@@ -987,9 +987,9 @@
                 </a:solidFill>
               </a:defRPr>
             </a:lvl5pPr>
-            <a:lvl6pPr marL="2286000" indent="0">
-              <a:buNone/>
-              <a:defRPr sz="1400">
+            <a:lvl6pPr marL="1645920" indent="0">
+              <a:buNone/>
+              <a:defRPr sz="1000">
                 <a:solidFill>
                   <a:schemeClr val="tx1">
                     <a:tint val="75000"/>
@@ -997,9 +997,9 @@
                 </a:solidFill>
               </a:defRPr>
             </a:lvl6pPr>
-            <a:lvl7pPr marL="2743200" indent="0">
-              <a:buNone/>
-              <a:defRPr sz="1400">
+            <a:lvl7pPr marL="1975104" indent="0">
+              <a:buNone/>
+              <a:defRPr sz="1000">
                 <a:solidFill>
                   <a:schemeClr val="tx1">
                     <a:tint val="75000"/>
@@ -1007,9 +1007,9 @@
                 </a:solidFill>
               </a:defRPr>
             </a:lvl7pPr>
-            <a:lvl8pPr marL="3200400" indent="0">
-              <a:buNone/>
-              <a:defRPr sz="1400">
+            <a:lvl8pPr marL="2304288" indent="0">
+              <a:buNone/>
+              <a:defRPr sz="1000">
                 <a:solidFill>
                   <a:schemeClr val="tx1">
                     <a:tint val="75000"/>
@@ -1017,9 +1017,9 @@
                 </a:solidFill>
               </a:defRPr>
             </a:lvl8pPr>
-            <a:lvl9pPr marL="3657600" indent="0">
-              <a:buNone/>
-              <a:defRPr sz="1400">
+            <a:lvl9pPr marL="2633472" indent="0">
+              <a:buNone/>
+              <a:defRPr sz="1000">
                 <a:solidFill>
                   <a:schemeClr val="tx1">
                     <a:tint val="75000"/>
@@ -1054,7 +1054,7 @@
           <a:p>
             <a:fld id="{DB1027F9-481E-4E2A-88FE-95C505FB87A8}" type="datetimeFigureOut">
               <a:rPr lang="de-DE" smtClean="0"/>
-              <a:t>06.06.2016</a:t>
+              <a:t>15.06.2016</a:t>
             </a:fld>
             <a:endParaRPr lang="de-DE"/>
           </a:p>
@@ -1167,39 +1167,39 @@
         </p:nvSpPr>
         <p:spPr>
           <a:xfrm>
-            <a:off x="457200" y="1600200"/>
-            <a:ext cx="4038600" cy="4525963"/>
+            <a:off x="360045" y="1008274"/>
+            <a:ext cx="3180398" cy="2851776"/>
           </a:xfrm>
         </p:spPr>
         <p:txBody>
           <a:bodyPr/>
           <a:lstStyle>
             <a:lvl1pPr>
-              <a:defRPr sz="2800"/>
+              <a:defRPr sz="2000"/>
             </a:lvl1pPr>
             <a:lvl2pPr>
-              <a:defRPr sz="2400"/>
+              <a:defRPr sz="1700"/>
             </a:lvl2pPr>
             <a:lvl3pPr>
-              <a:defRPr sz="2000"/>
+              <a:defRPr sz="1400"/>
             </a:lvl3pPr>
             <a:lvl4pPr>
-              <a:defRPr sz="1800"/>
+              <a:defRPr sz="1300"/>
             </a:lvl4pPr>
             <a:lvl5pPr>
-              <a:defRPr sz="1800"/>
+              <a:defRPr sz="1300"/>
             </a:lvl5pPr>
             <a:lvl6pPr>
-              <a:defRPr sz="1800"/>
+              <a:defRPr sz="1300"/>
             </a:lvl6pPr>
             <a:lvl7pPr>
-              <a:defRPr sz="1800"/>
+              <a:defRPr sz="1300"/>
             </a:lvl7pPr>
             <a:lvl8pPr>
-              <a:defRPr sz="1800"/>
+              <a:defRPr sz="1300"/>
             </a:lvl8pPr>
             <a:lvl9pPr>
-              <a:defRPr sz="1800"/>
+              <a:defRPr sz="1300"/>
             </a:lvl9pPr>
           </a:lstStyle>
           <a:p>
@@ -1252,39 +1252,39 @@
         </p:nvSpPr>
         <p:spPr>
           <a:xfrm>
-            <a:off x="4648200" y="1600200"/>
-            <a:ext cx="4038600" cy="4525963"/>
+            <a:off x="3660457" y="1008274"/>
+            <a:ext cx="3180398" cy="2851776"/>
           </a:xfrm>
         </p:spPr>
         <p:txBody>
           <a:bodyPr/>
           <a:lstStyle>
             <a:lvl1pPr>
-              <a:defRPr sz="2800"/>
+              <a:defRPr sz="2000"/>
             </a:lvl1pPr>
             <a:lvl2pPr>
-              <a:defRPr sz="2400"/>
+              <a:defRPr sz="1700"/>
             </a:lvl2pPr>
             <a:lvl3pPr>
-              <a:defRPr sz="2000"/>
+              <a:defRPr sz="1400"/>
             </a:lvl3pPr>
             <a:lvl4pPr>
-              <a:defRPr sz="1800"/>
+              <a:defRPr sz="1300"/>
             </a:lvl4pPr>
             <a:lvl5pPr>
-              <a:defRPr sz="1800"/>
+              <a:defRPr sz="1300"/>
             </a:lvl5pPr>
             <a:lvl6pPr>
-              <a:defRPr sz="1800"/>
+              <a:defRPr sz="1300"/>
             </a:lvl6pPr>
             <a:lvl7pPr>
-              <a:defRPr sz="1800"/>
+              <a:defRPr sz="1300"/>
             </a:lvl7pPr>
             <a:lvl8pPr>
-              <a:defRPr sz="1800"/>
+              <a:defRPr sz="1300"/>
             </a:lvl8pPr>
             <a:lvl9pPr>
-              <a:defRPr sz="1800"/>
+              <a:defRPr sz="1300"/>
             </a:lvl9pPr>
           </a:lstStyle>
           <a:p>
@@ -1342,7 +1342,7 @@
           <a:p>
             <a:fld id="{DB1027F9-481E-4E2A-88FE-95C505FB87A8}" type="datetimeFigureOut">
               <a:rPr lang="de-DE" smtClean="0"/>
-              <a:t>06.06.2016</a:t>
+              <a:t>15.06.2016</a:t>
             </a:fld>
             <a:endParaRPr lang="de-DE"/>
           </a:p>
@@ -1459,8 +1459,8 @@
         </p:nvSpPr>
         <p:spPr>
           <a:xfrm>
-            <a:off x="457200" y="1535113"/>
-            <a:ext cx="4040188" cy="639762"/>
+            <a:off x="360045" y="967263"/>
+            <a:ext cx="3181648" cy="403109"/>
           </a:xfrm>
         </p:spPr>
         <p:txBody>
@@ -1468,39 +1468,39 @@
           <a:lstStyle>
             <a:lvl1pPr marL="0" indent="0">
               <a:buNone/>
-              <a:defRPr sz="2400" b="1"/>
+              <a:defRPr sz="1700" b="1"/>
             </a:lvl1pPr>
-            <a:lvl2pPr marL="457200" indent="0">
-              <a:buNone/>
-              <a:defRPr sz="2000" b="1"/>
+            <a:lvl2pPr marL="329184" indent="0">
+              <a:buNone/>
+              <a:defRPr sz="1400" b="1"/>
             </a:lvl2pPr>
-            <a:lvl3pPr marL="914400" indent="0">
-              <a:buNone/>
-              <a:defRPr sz="1800" b="1"/>
+            <a:lvl3pPr marL="658368" indent="0">
+              <a:buNone/>
+              <a:defRPr sz="1300" b="1"/>
             </a:lvl3pPr>
-            <a:lvl4pPr marL="1371600" indent="0">
-              <a:buNone/>
-              <a:defRPr sz="1600" b="1"/>
+            <a:lvl4pPr marL="987552" indent="0">
+              <a:buNone/>
+              <a:defRPr sz="1200" b="1"/>
             </a:lvl4pPr>
-            <a:lvl5pPr marL="1828800" indent="0">
-              <a:buNone/>
-              <a:defRPr sz="1600" b="1"/>
+            <a:lvl5pPr marL="1316736" indent="0">
+              <a:buNone/>
+              <a:defRPr sz="1200" b="1"/>
             </a:lvl5pPr>
-            <a:lvl6pPr marL="2286000" indent="0">
-              <a:buNone/>
-              <a:defRPr sz="1600" b="1"/>
+            <a:lvl6pPr marL="1645920" indent="0">
+              <a:buNone/>
+              <a:defRPr sz="1200" b="1"/>
             </a:lvl6pPr>
-            <a:lvl7pPr marL="2743200" indent="0">
-              <a:buNone/>
-              <a:defRPr sz="1600" b="1"/>
+            <a:lvl7pPr marL="1975104" indent="0">
+              <a:buNone/>
+              <a:defRPr sz="1200" b="1"/>
             </a:lvl7pPr>
-            <a:lvl8pPr marL="3200400" indent="0">
-              <a:buNone/>
-              <a:defRPr sz="1600" b="1"/>
+            <a:lvl8pPr marL="2304288" indent="0">
+              <a:buNone/>
+              <a:defRPr sz="1200" b="1"/>
             </a:lvl8pPr>
-            <a:lvl9pPr marL="3657600" indent="0">
-              <a:buNone/>
-              <a:defRPr sz="1600" b="1"/>
+            <a:lvl9pPr marL="2633472" indent="0">
+              <a:buNone/>
+              <a:defRPr sz="1200" b="1"/>
             </a:lvl9pPr>
           </a:lstStyle>
           <a:p>
@@ -1524,39 +1524,39 @@
         </p:nvSpPr>
         <p:spPr>
           <a:xfrm>
-            <a:off x="457200" y="2174875"/>
-            <a:ext cx="4040188" cy="3951288"/>
+            <a:off x="360045" y="1370373"/>
+            <a:ext cx="3181648" cy="2489677"/>
           </a:xfrm>
         </p:spPr>
         <p:txBody>
           <a:bodyPr/>
           <a:lstStyle>
             <a:lvl1pPr>
-              <a:defRPr sz="2400"/>
+              <a:defRPr sz="1700"/>
             </a:lvl1pPr>
             <a:lvl2pPr>
-              <a:defRPr sz="2000"/>
+              <a:defRPr sz="1400"/>
             </a:lvl2pPr>
             <a:lvl3pPr>
-              <a:defRPr sz="1800"/>
+              <a:defRPr sz="1300"/>
             </a:lvl3pPr>
             <a:lvl4pPr>
-              <a:defRPr sz="1600"/>
+              <a:defRPr sz="1200"/>
             </a:lvl4pPr>
             <a:lvl5pPr>
-              <a:defRPr sz="1600"/>
+              <a:defRPr sz="1200"/>
             </a:lvl5pPr>
             <a:lvl6pPr>
-              <a:defRPr sz="1600"/>
+              <a:defRPr sz="1200"/>
             </a:lvl6pPr>
             <a:lvl7pPr>
-              <a:defRPr sz="1600"/>
+              <a:defRPr sz="1200"/>
             </a:lvl7pPr>
             <a:lvl8pPr>
-              <a:defRPr sz="1600"/>
+              <a:defRPr sz="1200"/>
             </a:lvl8pPr>
             <a:lvl9pPr>
-              <a:defRPr sz="1600"/>
+              <a:defRPr sz="1200"/>
             </a:lvl9pPr>
           </a:lstStyle>
           <a:p>
@@ -1609,8 +1609,8 @@
         </p:nvSpPr>
         <p:spPr>
           <a:xfrm>
-            <a:off x="4645025" y="1535113"/>
-            <a:ext cx="4041775" cy="639762"/>
+            <a:off x="3657957" y="967263"/>
+            <a:ext cx="3182898" cy="403109"/>
           </a:xfrm>
         </p:spPr>
         <p:txBody>
@@ -1618,39 +1618,39 @@
           <a:lstStyle>
             <a:lvl1pPr marL="0" indent="0">
               <a:buNone/>
-              <a:defRPr sz="2400" b="1"/>
+              <a:defRPr sz="1700" b="1"/>
             </a:lvl1pPr>
-            <a:lvl2pPr marL="457200" indent="0">
-              <a:buNone/>
-              <a:defRPr sz="2000" b="1"/>
+            <a:lvl2pPr marL="329184" indent="0">
+              <a:buNone/>
+              <a:defRPr sz="1400" b="1"/>
             </a:lvl2pPr>
-            <a:lvl3pPr marL="914400" indent="0">
-              <a:buNone/>
-              <a:defRPr sz="1800" b="1"/>
+            <a:lvl3pPr marL="658368" indent="0">
+              <a:buNone/>
+              <a:defRPr sz="1300" b="1"/>
             </a:lvl3pPr>
-            <a:lvl4pPr marL="1371600" indent="0">
-              <a:buNone/>
-              <a:defRPr sz="1600" b="1"/>
+            <a:lvl4pPr marL="987552" indent="0">
+              <a:buNone/>
+              <a:defRPr sz="1200" b="1"/>
             </a:lvl4pPr>
-            <a:lvl5pPr marL="1828800" indent="0">
-              <a:buNone/>
-              <a:defRPr sz="1600" b="1"/>
+            <a:lvl5pPr marL="1316736" indent="0">
+              <a:buNone/>
+              <a:defRPr sz="1200" b="1"/>
             </a:lvl5pPr>
-            <a:lvl6pPr marL="2286000" indent="0">
-              <a:buNone/>
-              <a:defRPr sz="1600" b="1"/>
+            <a:lvl6pPr marL="1645920" indent="0">
+              <a:buNone/>
+              <a:defRPr sz="1200" b="1"/>
             </a:lvl6pPr>
-            <a:lvl7pPr marL="2743200" indent="0">
-              <a:buNone/>
-              <a:defRPr sz="1600" b="1"/>
+            <a:lvl7pPr marL="1975104" indent="0">
+              <a:buNone/>
+              <a:defRPr sz="1200" b="1"/>
             </a:lvl7pPr>
-            <a:lvl8pPr marL="3200400" indent="0">
-              <a:buNone/>
-              <a:defRPr sz="1600" b="1"/>
+            <a:lvl8pPr marL="2304288" indent="0">
+              <a:buNone/>
+              <a:defRPr sz="1200" b="1"/>
             </a:lvl8pPr>
-            <a:lvl9pPr marL="3657600" indent="0">
-              <a:buNone/>
-              <a:defRPr sz="1600" b="1"/>
+            <a:lvl9pPr marL="2633472" indent="0">
+              <a:buNone/>
+              <a:defRPr sz="1200" b="1"/>
             </a:lvl9pPr>
           </a:lstStyle>
           <a:p>
@@ -1674,39 +1674,39 @@
         </p:nvSpPr>
         <p:spPr>
           <a:xfrm>
-            <a:off x="4645025" y="2174875"/>
-            <a:ext cx="4041775" cy="3951288"/>
+            <a:off x="3657957" y="1370373"/>
+            <a:ext cx="3182898" cy="2489677"/>
           </a:xfrm>
         </p:spPr>
         <p:txBody>
           <a:bodyPr/>
           <a:lstStyle>
             <a:lvl1pPr>
-              <a:defRPr sz="2400"/>
+              <a:defRPr sz="1700"/>
             </a:lvl1pPr>
             <a:lvl2pPr>
-              <a:defRPr sz="2000"/>
+              <a:defRPr sz="1400"/>
             </a:lvl2pPr>
             <a:lvl3pPr>
-              <a:defRPr sz="1800"/>
+              <a:defRPr sz="1300"/>
             </a:lvl3pPr>
             <a:lvl4pPr>
-              <a:defRPr sz="1600"/>
+              <a:defRPr sz="1200"/>
             </a:lvl4pPr>
             <a:lvl5pPr>
-              <a:defRPr sz="1600"/>
+              <a:defRPr sz="1200"/>
             </a:lvl5pPr>
             <a:lvl6pPr>
-              <a:defRPr sz="1600"/>
+              <a:defRPr sz="1200"/>
             </a:lvl6pPr>
             <a:lvl7pPr>
-              <a:defRPr sz="1600"/>
+              <a:defRPr sz="1200"/>
             </a:lvl7pPr>
             <a:lvl8pPr>
-              <a:defRPr sz="1600"/>
+              <a:defRPr sz="1200"/>
             </a:lvl8pPr>
             <a:lvl9pPr>
-              <a:defRPr sz="1600"/>
+              <a:defRPr sz="1200"/>
             </a:lvl9pPr>
           </a:lstStyle>
           <a:p>
@@ -1764,7 +1764,7 @@
           <a:p>
             <a:fld id="{DB1027F9-481E-4E2A-88FE-95C505FB87A8}" type="datetimeFigureOut">
               <a:rPr lang="de-DE" smtClean="0"/>
-              <a:t>06.06.2016</a:t>
+              <a:t>15.06.2016</a:t>
             </a:fld>
             <a:endParaRPr lang="de-DE"/>
           </a:p>
@@ -1882,7 +1882,7 @@
           <a:p>
             <a:fld id="{DB1027F9-481E-4E2A-88FE-95C505FB87A8}" type="datetimeFigureOut">
               <a:rPr lang="de-DE" smtClean="0"/>
-              <a:t>06.06.2016</a:t>
+              <a:t>15.06.2016</a:t>
             </a:fld>
             <a:endParaRPr lang="de-DE"/>
           </a:p>
@@ -1977,7 +1977,7 @@
           <a:p>
             <a:fld id="{DB1027F9-481E-4E2A-88FE-95C505FB87A8}" type="datetimeFigureOut">
               <a:rPr lang="de-DE" smtClean="0"/>
-              <a:t>06.06.2016</a:t>
+              <a:t>15.06.2016</a:t>
             </a:fld>
             <a:endParaRPr lang="de-DE"/>
           </a:p>
@@ -2067,15 +2067,15 @@
         </p:nvSpPr>
         <p:spPr>
           <a:xfrm>
-            <a:off x="457200" y="273050"/>
-            <a:ext cx="3008313" cy="1162050"/>
+            <a:off x="360046" y="172047"/>
+            <a:ext cx="2369046" cy="732199"/>
           </a:xfrm>
         </p:spPr>
         <p:txBody>
           <a:bodyPr anchor="b"/>
           <a:lstStyle>
             <a:lvl1pPr algn="l">
-              <a:defRPr sz="2000" b="1"/>
+              <a:defRPr sz="1400" b="1"/>
             </a:lvl1pPr>
           </a:lstStyle>
           <a:p>
@@ -2099,39 +2099,39 @@
         </p:nvSpPr>
         <p:spPr>
           <a:xfrm>
-            <a:off x="3575050" y="273050"/>
-            <a:ext cx="5111750" cy="5853113"/>
+            <a:off x="2815352" y="172047"/>
+            <a:ext cx="4025503" cy="3688003"/>
           </a:xfrm>
         </p:spPr>
         <p:txBody>
           <a:bodyPr/>
           <a:lstStyle>
             <a:lvl1pPr>
-              <a:defRPr sz="3200"/>
+              <a:defRPr sz="2300"/>
             </a:lvl1pPr>
             <a:lvl2pPr>
-              <a:defRPr sz="2800"/>
+              <a:defRPr sz="2000"/>
             </a:lvl2pPr>
             <a:lvl3pPr>
-              <a:defRPr sz="2400"/>
+              <a:defRPr sz="1700"/>
             </a:lvl3pPr>
             <a:lvl4pPr>
-              <a:defRPr sz="2000"/>
+              <a:defRPr sz="1400"/>
             </a:lvl4pPr>
             <a:lvl5pPr>
-              <a:defRPr sz="2000"/>
+              <a:defRPr sz="1400"/>
             </a:lvl5pPr>
             <a:lvl6pPr>
-              <a:defRPr sz="2000"/>
+              <a:defRPr sz="1400"/>
             </a:lvl6pPr>
             <a:lvl7pPr>
-              <a:defRPr sz="2000"/>
+              <a:defRPr sz="1400"/>
             </a:lvl7pPr>
             <a:lvl8pPr>
-              <a:defRPr sz="2000"/>
+              <a:defRPr sz="1400"/>
             </a:lvl8pPr>
             <a:lvl9pPr>
-              <a:defRPr sz="2000"/>
+              <a:defRPr sz="1400"/>
             </a:lvl9pPr>
           </a:lstStyle>
           <a:p>
@@ -2184,8 +2184,8 @@
         </p:nvSpPr>
         <p:spPr>
           <a:xfrm>
-            <a:off x="457200" y="1435100"/>
-            <a:ext cx="3008313" cy="4691063"/>
+            <a:off x="360046" y="904246"/>
+            <a:ext cx="2369046" cy="2955804"/>
           </a:xfrm>
         </p:spPr>
         <p:txBody>
@@ -2193,39 +2193,39 @@
           <a:lstStyle>
             <a:lvl1pPr marL="0" indent="0">
               <a:buNone/>
-              <a:defRPr sz="1400"/>
+              <a:defRPr sz="1000"/>
             </a:lvl1pPr>
-            <a:lvl2pPr marL="457200" indent="0">
-              <a:buNone/>
-              <a:defRPr sz="1200"/>
+            <a:lvl2pPr marL="329184" indent="0">
+              <a:buNone/>
+              <a:defRPr sz="900"/>
             </a:lvl2pPr>
-            <a:lvl3pPr marL="914400" indent="0">
-              <a:buNone/>
-              <a:defRPr sz="1000"/>
+            <a:lvl3pPr marL="658368" indent="0">
+              <a:buNone/>
+              <a:defRPr sz="700"/>
             </a:lvl3pPr>
-            <a:lvl4pPr marL="1371600" indent="0">
-              <a:buNone/>
-              <a:defRPr sz="900"/>
+            <a:lvl4pPr marL="987552" indent="0">
+              <a:buNone/>
+              <a:defRPr sz="600"/>
             </a:lvl4pPr>
-            <a:lvl5pPr marL="1828800" indent="0">
-              <a:buNone/>
-              <a:defRPr sz="900"/>
+            <a:lvl5pPr marL="1316736" indent="0">
+              <a:buNone/>
+              <a:defRPr sz="600"/>
             </a:lvl5pPr>
-            <a:lvl6pPr marL="2286000" indent="0">
-              <a:buNone/>
-              <a:defRPr sz="900"/>
+            <a:lvl6pPr marL="1645920" indent="0">
+              <a:buNone/>
+              <a:defRPr sz="600"/>
             </a:lvl6pPr>
-            <a:lvl7pPr marL="2743200" indent="0">
-              <a:buNone/>
-              <a:defRPr sz="900"/>
+            <a:lvl7pPr marL="1975104" indent="0">
+              <a:buNone/>
+              <a:defRPr sz="600"/>
             </a:lvl7pPr>
-            <a:lvl8pPr marL="3200400" indent="0">
-              <a:buNone/>
-              <a:defRPr sz="900"/>
+            <a:lvl8pPr marL="2304288" indent="0">
+              <a:buNone/>
+              <a:defRPr sz="600"/>
             </a:lvl8pPr>
-            <a:lvl9pPr marL="3657600" indent="0">
-              <a:buNone/>
-              <a:defRPr sz="900"/>
+            <a:lvl9pPr marL="2633472" indent="0">
+              <a:buNone/>
+              <a:defRPr sz="600"/>
             </a:lvl9pPr>
           </a:lstStyle>
           <a:p>
@@ -2254,7 +2254,7 @@
           <a:p>
             <a:fld id="{DB1027F9-481E-4E2A-88FE-95C505FB87A8}" type="datetimeFigureOut">
               <a:rPr lang="de-DE" smtClean="0"/>
-              <a:t>06.06.2016</a:t>
+              <a:t>15.06.2016</a:t>
             </a:fld>
             <a:endParaRPr lang="de-DE"/>
           </a:p>
@@ -2344,15 +2344,15 @@
         </p:nvSpPr>
         <p:spPr>
           <a:xfrm>
-            <a:off x="1792288" y="4800600"/>
-            <a:ext cx="5486400" cy="566738"/>
+            <a:off x="1411427" y="3024823"/>
+            <a:ext cx="4320540" cy="357097"/>
           </a:xfrm>
         </p:spPr>
         <p:txBody>
           <a:bodyPr anchor="b"/>
           <a:lstStyle>
             <a:lvl1pPr algn="l">
-              <a:defRPr sz="2000" b="1"/>
+              <a:defRPr sz="1400" b="1"/>
             </a:lvl1pPr>
           </a:lstStyle>
           <a:p>
@@ -2376,8 +2376,8 @@
         </p:nvSpPr>
         <p:spPr>
           <a:xfrm>
-            <a:off x="1792288" y="612775"/>
-            <a:ext cx="5486400" cy="4114800"/>
+            <a:off x="1411427" y="386105"/>
+            <a:ext cx="4320540" cy="2592705"/>
           </a:xfrm>
         </p:spPr>
         <p:txBody>
@@ -2385,39 +2385,39 @@
           <a:lstStyle>
             <a:lvl1pPr marL="0" indent="0">
               <a:buNone/>
-              <a:defRPr sz="3200"/>
+              <a:defRPr sz="2300"/>
             </a:lvl1pPr>
-            <a:lvl2pPr marL="457200" indent="0">
-              <a:buNone/>
-              <a:defRPr sz="2800"/>
+            <a:lvl2pPr marL="329184" indent="0">
+              <a:buNone/>
+              <a:defRPr sz="2000"/>
             </a:lvl2pPr>
-            <a:lvl3pPr marL="914400" indent="0">
-              <a:buNone/>
-              <a:defRPr sz="2400"/>
+            <a:lvl3pPr marL="658368" indent="0">
+              <a:buNone/>
+              <a:defRPr sz="1700"/>
             </a:lvl3pPr>
-            <a:lvl4pPr marL="1371600" indent="0">
-              <a:buNone/>
-              <a:defRPr sz="2000"/>
+            <a:lvl4pPr marL="987552" indent="0">
+              <a:buNone/>
+              <a:defRPr sz="1400"/>
             </a:lvl4pPr>
-            <a:lvl5pPr marL="1828800" indent="0">
-              <a:buNone/>
-              <a:defRPr sz="2000"/>
+            <a:lvl5pPr marL="1316736" indent="0">
+              <a:buNone/>
+              <a:defRPr sz="1400"/>
             </a:lvl5pPr>
-            <a:lvl6pPr marL="2286000" indent="0">
-              <a:buNone/>
-              <a:defRPr sz="2000"/>
+            <a:lvl6pPr marL="1645920" indent="0">
+              <a:buNone/>
+              <a:defRPr sz="1400"/>
             </a:lvl6pPr>
-            <a:lvl7pPr marL="2743200" indent="0">
-              <a:buNone/>
-              <a:defRPr sz="2000"/>
+            <a:lvl7pPr marL="1975104" indent="0">
+              <a:buNone/>
+              <a:defRPr sz="1400"/>
             </a:lvl7pPr>
-            <a:lvl8pPr marL="3200400" indent="0">
-              <a:buNone/>
-              <a:defRPr sz="2000"/>
+            <a:lvl8pPr marL="2304288" indent="0">
+              <a:buNone/>
+              <a:defRPr sz="1400"/>
             </a:lvl8pPr>
-            <a:lvl9pPr marL="3657600" indent="0">
-              <a:buNone/>
-              <a:defRPr sz="2000"/>
+            <a:lvl9pPr marL="2633472" indent="0">
+              <a:buNone/>
+              <a:defRPr sz="1400"/>
             </a:lvl9pPr>
           </a:lstStyle>
           <a:p>
@@ -2437,8 +2437,8 @@
         </p:nvSpPr>
         <p:spPr>
           <a:xfrm>
-            <a:off x="1792288" y="5367338"/>
-            <a:ext cx="5486400" cy="804862"/>
+            <a:off x="1411427" y="3381920"/>
+            <a:ext cx="4320540" cy="507138"/>
           </a:xfrm>
         </p:spPr>
         <p:txBody>
@@ -2446,39 +2446,39 @@
           <a:lstStyle>
             <a:lvl1pPr marL="0" indent="0">
               <a:buNone/>
-              <a:defRPr sz="1400"/>
+              <a:defRPr sz="1000"/>
             </a:lvl1pPr>
-            <a:lvl2pPr marL="457200" indent="0">
-              <a:buNone/>
-              <a:defRPr sz="1200"/>
+            <a:lvl2pPr marL="329184" indent="0">
+              <a:buNone/>
+              <a:defRPr sz="900"/>
             </a:lvl2pPr>
-            <a:lvl3pPr marL="914400" indent="0">
-              <a:buNone/>
-              <a:defRPr sz="1000"/>
+            <a:lvl3pPr marL="658368" indent="0">
+              <a:buNone/>
+              <a:defRPr sz="700"/>
             </a:lvl3pPr>
-            <a:lvl4pPr marL="1371600" indent="0">
-              <a:buNone/>
-              <a:defRPr sz="900"/>
+            <a:lvl4pPr marL="987552" indent="0">
+              <a:buNone/>
+              <a:defRPr sz="600"/>
             </a:lvl4pPr>
-            <a:lvl5pPr marL="1828800" indent="0">
-              <a:buNone/>
-              <a:defRPr sz="900"/>
+            <a:lvl5pPr marL="1316736" indent="0">
+              <a:buNone/>
+              <a:defRPr sz="600"/>
             </a:lvl5pPr>
-            <a:lvl6pPr marL="2286000" indent="0">
-              <a:buNone/>
-              <a:defRPr sz="900"/>
+            <a:lvl6pPr marL="1645920" indent="0">
+              <a:buNone/>
+              <a:defRPr sz="600"/>
             </a:lvl6pPr>
-            <a:lvl7pPr marL="2743200" indent="0">
-              <a:buNone/>
-              <a:defRPr sz="900"/>
+            <a:lvl7pPr marL="1975104" indent="0">
+              <a:buNone/>
+              <a:defRPr sz="600"/>
             </a:lvl7pPr>
-            <a:lvl8pPr marL="3200400" indent="0">
-              <a:buNone/>
-              <a:defRPr sz="900"/>
+            <a:lvl8pPr marL="2304288" indent="0">
+              <a:buNone/>
+              <a:defRPr sz="600"/>
             </a:lvl8pPr>
-            <a:lvl9pPr marL="3657600" indent="0">
-              <a:buNone/>
-              <a:defRPr sz="900"/>
+            <a:lvl9pPr marL="2633472" indent="0">
+              <a:buNone/>
+              <a:defRPr sz="600"/>
             </a:lvl9pPr>
           </a:lstStyle>
           <a:p>
@@ -2507,7 +2507,7 @@
           <a:p>
             <a:fld id="{DB1027F9-481E-4E2A-88FE-95C505FB87A8}" type="datetimeFigureOut">
               <a:rPr lang="de-DE" smtClean="0"/>
-              <a:t>06.06.2016</a:t>
+              <a:t>15.06.2016</a:t>
             </a:fld>
             <a:endParaRPr lang="de-DE"/>
           </a:p>
@@ -2602,15 +2602,15 @@
         </p:nvSpPr>
         <p:spPr>
           <a:xfrm>
-            <a:off x="457200" y="274638"/>
-            <a:ext cx="8229600" cy="1143000"/>
+            <a:off x="360045" y="173047"/>
+            <a:ext cx="6480810" cy="720196"/>
           </a:xfrm>
           <a:prstGeom prst="rect">
             <a:avLst/>
           </a:prstGeom>
         </p:spPr>
         <p:txBody>
-          <a:bodyPr vert="horz" lIns="91440" tIns="45720" rIns="91440" bIns="45720" rtlCol="0" anchor="ctr">
+          <a:bodyPr vert="horz" lIns="65837" tIns="32918" rIns="65837" bIns="32918" rtlCol="0" anchor="ctr">
             <a:normAutofit/>
           </a:bodyPr>
           <a:lstStyle/>
@@ -2635,15 +2635,15 @@
         </p:nvSpPr>
         <p:spPr>
           <a:xfrm>
-            <a:off x="457200" y="1600200"/>
-            <a:ext cx="8229600" cy="4525963"/>
+            <a:off x="360045" y="1008274"/>
+            <a:ext cx="6480810" cy="2851776"/>
           </a:xfrm>
           <a:prstGeom prst="rect">
             <a:avLst/>
           </a:prstGeom>
         </p:spPr>
         <p:txBody>
-          <a:bodyPr vert="horz" lIns="91440" tIns="45720" rIns="91440" bIns="45720" rtlCol="0">
+          <a:bodyPr vert="horz" lIns="65837" tIns="32918" rIns="65837" bIns="32918" rtlCol="0">
             <a:normAutofit/>
           </a:bodyPr>
           <a:lstStyle/>
@@ -2697,18 +2697,18 @@
         </p:nvSpPr>
         <p:spPr>
           <a:xfrm>
-            <a:off x="457200" y="6356350"/>
-            <a:ext cx="2133600" cy="365125"/>
+            <a:off x="360045" y="4005089"/>
+            <a:ext cx="1680210" cy="230063"/>
           </a:xfrm>
           <a:prstGeom prst="rect">
             <a:avLst/>
           </a:prstGeom>
         </p:spPr>
         <p:txBody>
-          <a:bodyPr vert="horz" lIns="91440" tIns="45720" rIns="91440" bIns="45720" rtlCol="0" anchor="ctr"/>
+          <a:bodyPr vert="horz" lIns="65837" tIns="32918" rIns="65837" bIns="32918" rtlCol="0" anchor="ctr"/>
           <a:lstStyle>
             <a:lvl1pPr algn="l">
-              <a:defRPr sz="1200">
+              <a:defRPr sz="900">
                 <a:solidFill>
                   <a:schemeClr val="tx1">
                     <a:tint val="75000"/>
@@ -2720,7 +2720,7 @@
           <a:p>
             <a:fld id="{DB1027F9-481E-4E2A-88FE-95C505FB87A8}" type="datetimeFigureOut">
               <a:rPr lang="de-DE" smtClean="0"/>
-              <a:t>06.06.2016</a:t>
+              <a:t>15.06.2016</a:t>
             </a:fld>
             <a:endParaRPr lang="de-DE"/>
           </a:p>
@@ -2738,18 +2738,18 @@
         </p:nvSpPr>
         <p:spPr>
           <a:xfrm>
-            <a:off x="3124200" y="6356350"/>
-            <a:ext cx="2895600" cy="365125"/>
+            <a:off x="2460308" y="4005089"/>
+            <a:ext cx="2280285" cy="230063"/>
           </a:xfrm>
           <a:prstGeom prst="rect">
             <a:avLst/>
           </a:prstGeom>
         </p:spPr>
         <p:txBody>
-          <a:bodyPr vert="horz" lIns="91440" tIns="45720" rIns="91440" bIns="45720" rtlCol="0" anchor="ctr"/>
+          <a:bodyPr vert="horz" lIns="65837" tIns="32918" rIns="65837" bIns="32918" rtlCol="0" anchor="ctr"/>
           <a:lstStyle>
             <a:lvl1pPr algn="ctr">
-              <a:defRPr sz="1200">
+              <a:defRPr sz="900">
                 <a:solidFill>
                   <a:schemeClr val="tx1">
                     <a:tint val="75000"/>
@@ -2775,18 +2775,18 @@
         </p:nvSpPr>
         <p:spPr>
           <a:xfrm>
-            <a:off x="6553200" y="6356350"/>
-            <a:ext cx="2133600" cy="365125"/>
+            <a:off x="5160645" y="4005089"/>
+            <a:ext cx="1680210" cy="230063"/>
           </a:xfrm>
           <a:prstGeom prst="rect">
             <a:avLst/>
           </a:prstGeom>
         </p:spPr>
         <p:txBody>
-          <a:bodyPr vert="horz" lIns="91440" tIns="45720" rIns="91440" bIns="45720" rtlCol="0" anchor="ctr"/>
+          <a:bodyPr vert="horz" lIns="65837" tIns="32918" rIns="65837" bIns="32918" rtlCol="0" anchor="ctr"/>
           <a:lstStyle>
             <a:lvl1pPr algn="r">
-              <a:defRPr sz="1200">
+              <a:defRPr sz="900">
                 <a:solidFill>
                   <a:schemeClr val="tx1">
                     <a:tint val="75000"/>
@@ -2827,12 +2827,12 @@
   </p:sldLayoutIdLst>
   <p:txStyles>
     <p:titleStyle>
-      <a:lvl1pPr algn="ctr" defTabSz="914400" rtl="0" eaLnBrk="1" latinLnBrk="0" hangingPunct="1">
+      <a:lvl1pPr algn="ctr" defTabSz="658368" rtl="0" eaLnBrk="1" latinLnBrk="0" hangingPunct="1">
         <a:spcBef>
           <a:spcPct val="0"/>
         </a:spcBef>
         <a:buNone/>
-        <a:defRPr sz="4400" kern="1200">
+        <a:defRPr sz="3200" kern="1200">
           <a:solidFill>
             <a:schemeClr val="tx1"/>
           </a:solidFill>
@@ -2843,13 +2843,13 @@
       </a:lvl1pPr>
     </p:titleStyle>
     <p:bodyStyle>
-      <a:lvl1pPr marL="342900" indent="-342900" algn="l" defTabSz="914400" rtl="0" eaLnBrk="1" latinLnBrk="0" hangingPunct="1">
+      <a:lvl1pPr marL="246888" indent="-246888" algn="l" defTabSz="658368" rtl="0" eaLnBrk="1" latinLnBrk="0" hangingPunct="1">
         <a:spcBef>
           <a:spcPct val="20000"/>
         </a:spcBef>
         <a:buFont typeface="Arial" panose="020B0604020202020204" pitchFamily="34" charset="0"/>
         <a:buChar char="•"/>
-        <a:defRPr sz="3200" kern="1200">
+        <a:defRPr sz="2300" kern="1200">
           <a:solidFill>
             <a:schemeClr val="tx1"/>
           </a:solidFill>
@@ -2858,37 +2858,7 @@
           <a:cs typeface="+mn-cs"/>
         </a:defRPr>
       </a:lvl1pPr>
-      <a:lvl2pPr marL="742950" indent="-285750" algn="l" defTabSz="914400" rtl="0" eaLnBrk="1" latinLnBrk="0" hangingPunct="1">
-        <a:spcBef>
-          <a:spcPct val="20000"/>
-        </a:spcBef>
-        <a:buFont typeface="Arial" panose="020B0604020202020204" pitchFamily="34" charset="0"/>
-        <a:buChar char="–"/>
-        <a:defRPr sz="2800" kern="1200">
-          <a:solidFill>
-            <a:schemeClr val="tx1"/>
-          </a:solidFill>
-          <a:latin typeface="+mn-lt"/>
-          <a:ea typeface="+mn-ea"/>
-          <a:cs typeface="+mn-cs"/>
-        </a:defRPr>
-      </a:lvl2pPr>
-      <a:lvl3pPr marL="1143000" indent="-228600" algn="l" defTabSz="914400" rtl="0" eaLnBrk="1" latinLnBrk="0" hangingPunct="1">
-        <a:spcBef>
-          <a:spcPct val="20000"/>
-        </a:spcBef>
-        <a:buFont typeface="Arial" panose="020B0604020202020204" pitchFamily="34" charset="0"/>
-        <a:buChar char="•"/>
-        <a:defRPr sz="2400" kern="1200">
-          <a:solidFill>
-            <a:schemeClr val="tx1"/>
-          </a:solidFill>
-          <a:latin typeface="+mn-lt"/>
-          <a:ea typeface="+mn-ea"/>
-          <a:cs typeface="+mn-cs"/>
-        </a:defRPr>
-      </a:lvl3pPr>
-      <a:lvl4pPr marL="1600200" indent="-228600" algn="l" defTabSz="914400" rtl="0" eaLnBrk="1" latinLnBrk="0" hangingPunct="1">
+      <a:lvl2pPr marL="534924" indent="-205740" algn="l" defTabSz="658368" rtl="0" eaLnBrk="1" latinLnBrk="0" hangingPunct="1">
         <a:spcBef>
           <a:spcPct val="20000"/>
         </a:spcBef>
@@ -2902,14 +2872,44 @@
           <a:ea typeface="+mn-ea"/>
           <a:cs typeface="+mn-cs"/>
         </a:defRPr>
+      </a:lvl2pPr>
+      <a:lvl3pPr marL="822960" indent="-164592" algn="l" defTabSz="658368" rtl="0" eaLnBrk="1" latinLnBrk="0" hangingPunct="1">
+        <a:spcBef>
+          <a:spcPct val="20000"/>
+        </a:spcBef>
+        <a:buFont typeface="Arial" panose="020B0604020202020204" pitchFamily="34" charset="0"/>
+        <a:buChar char="•"/>
+        <a:defRPr sz="1700" kern="1200">
+          <a:solidFill>
+            <a:schemeClr val="tx1"/>
+          </a:solidFill>
+          <a:latin typeface="+mn-lt"/>
+          <a:ea typeface="+mn-ea"/>
+          <a:cs typeface="+mn-cs"/>
+        </a:defRPr>
+      </a:lvl3pPr>
+      <a:lvl4pPr marL="1152144" indent="-164592" algn="l" defTabSz="658368" rtl="0" eaLnBrk="1" latinLnBrk="0" hangingPunct="1">
+        <a:spcBef>
+          <a:spcPct val="20000"/>
+        </a:spcBef>
+        <a:buFont typeface="Arial" panose="020B0604020202020204" pitchFamily="34" charset="0"/>
+        <a:buChar char="–"/>
+        <a:defRPr sz="1400" kern="1200">
+          <a:solidFill>
+            <a:schemeClr val="tx1"/>
+          </a:solidFill>
+          <a:latin typeface="+mn-lt"/>
+          <a:ea typeface="+mn-ea"/>
+          <a:cs typeface="+mn-cs"/>
+        </a:defRPr>
       </a:lvl4pPr>
-      <a:lvl5pPr marL="2057400" indent="-228600" algn="l" defTabSz="914400" rtl="0" eaLnBrk="1" latinLnBrk="0" hangingPunct="1">
+      <a:lvl5pPr marL="1481328" indent="-164592" algn="l" defTabSz="658368" rtl="0" eaLnBrk="1" latinLnBrk="0" hangingPunct="1">
         <a:spcBef>
           <a:spcPct val="20000"/>
         </a:spcBef>
         <a:buFont typeface="Arial" panose="020B0604020202020204" pitchFamily="34" charset="0"/>
         <a:buChar char="»"/>
-        <a:defRPr sz="2000" kern="1200">
+        <a:defRPr sz="1400" kern="1200">
           <a:solidFill>
             <a:schemeClr val="tx1"/>
           </a:solidFill>
@@ -2918,13 +2918,13 @@
           <a:cs typeface="+mn-cs"/>
         </a:defRPr>
       </a:lvl5pPr>
-      <a:lvl6pPr marL="2514600" indent="-228600" algn="l" defTabSz="914400" rtl="0" eaLnBrk="1" latinLnBrk="0" hangingPunct="1">
+      <a:lvl6pPr marL="1810512" indent="-164592" algn="l" defTabSz="658368" rtl="0" eaLnBrk="1" latinLnBrk="0" hangingPunct="1">
         <a:spcBef>
           <a:spcPct val="20000"/>
         </a:spcBef>
         <a:buFont typeface="Arial" panose="020B0604020202020204" pitchFamily="34" charset="0"/>
         <a:buChar char="•"/>
-        <a:defRPr sz="2000" kern="1200">
+        <a:defRPr sz="1400" kern="1200">
           <a:solidFill>
             <a:schemeClr val="tx1"/>
           </a:solidFill>
@@ -2933,13 +2933,13 @@
           <a:cs typeface="+mn-cs"/>
         </a:defRPr>
       </a:lvl6pPr>
-      <a:lvl7pPr marL="2971800" indent="-228600" algn="l" defTabSz="914400" rtl="0" eaLnBrk="1" latinLnBrk="0" hangingPunct="1">
+      <a:lvl7pPr marL="2139696" indent="-164592" algn="l" defTabSz="658368" rtl="0" eaLnBrk="1" latinLnBrk="0" hangingPunct="1">
         <a:spcBef>
           <a:spcPct val="20000"/>
         </a:spcBef>
         <a:buFont typeface="Arial" panose="020B0604020202020204" pitchFamily="34" charset="0"/>
         <a:buChar char="•"/>
-        <a:defRPr sz="2000" kern="1200">
+        <a:defRPr sz="1400" kern="1200">
           <a:solidFill>
             <a:schemeClr val="tx1"/>
           </a:solidFill>
@@ -2948,13 +2948,13 @@
           <a:cs typeface="+mn-cs"/>
         </a:defRPr>
       </a:lvl7pPr>
-      <a:lvl8pPr marL="3429000" indent="-228600" algn="l" defTabSz="914400" rtl="0" eaLnBrk="1" latinLnBrk="0" hangingPunct="1">
+      <a:lvl8pPr marL="2468880" indent="-164592" algn="l" defTabSz="658368" rtl="0" eaLnBrk="1" latinLnBrk="0" hangingPunct="1">
         <a:spcBef>
           <a:spcPct val="20000"/>
         </a:spcBef>
         <a:buFont typeface="Arial" panose="020B0604020202020204" pitchFamily="34" charset="0"/>
         <a:buChar char="•"/>
-        <a:defRPr sz="2000" kern="1200">
+        <a:defRPr sz="1400" kern="1200">
           <a:solidFill>
             <a:schemeClr val="tx1"/>
           </a:solidFill>
@@ -2963,13 +2963,13 @@
           <a:cs typeface="+mn-cs"/>
         </a:defRPr>
       </a:lvl8pPr>
-      <a:lvl9pPr marL="3886200" indent="-228600" algn="l" defTabSz="914400" rtl="0" eaLnBrk="1" latinLnBrk="0" hangingPunct="1">
+      <a:lvl9pPr marL="2798064" indent="-164592" algn="l" defTabSz="658368" rtl="0" eaLnBrk="1" latinLnBrk="0" hangingPunct="1">
         <a:spcBef>
           <a:spcPct val="20000"/>
         </a:spcBef>
         <a:buFont typeface="Arial" panose="020B0604020202020204" pitchFamily="34" charset="0"/>
         <a:buChar char="•"/>
-        <a:defRPr sz="2000" kern="1200">
+        <a:defRPr sz="1400" kern="1200">
           <a:solidFill>
             <a:schemeClr val="tx1"/>
           </a:solidFill>
@@ -2983,8 +2983,8 @@
       <a:defPPr>
         <a:defRPr lang="de-DE"/>
       </a:defPPr>
-      <a:lvl1pPr marL="0" algn="l" defTabSz="914400" rtl="0" eaLnBrk="1" latinLnBrk="0" hangingPunct="1">
-        <a:defRPr sz="1800" kern="1200">
+      <a:lvl1pPr marL="0" algn="l" defTabSz="658368" rtl="0" eaLnBrk="1" latinLnBrk="0" hangingPunct="1">
+        <a:defRPr sz="1300" kern="1200">
           <a:solidFill>
             <a:schemeClr val="tx1"/>
           </a:solidFill>
@@ -2993,8 +2993,8 @@
           <a:cs typeface="+mn-cs"/>
         </a:defRPr>
       </a:lvl1pPr>
-      <a:lvl2pPr marL="457200" algn="l" defTabSz="914400" rtl="0" eaLnBrk="1" latinLnBrk="0" hangingPunct="1">
-        <a:defRPr sz="1800" kern="1200">
+      <a:lvl2pPr marL="329184" algn="l" defTabSz="658368" rtl="0" eaLnBrk="1" latinLnBrk="0" hangingPunct="1">
+        <a:defRPr sz="1300" kern="1200">
           <a:solidFill>
             <a:schemeClr val="tx1"/>
           </a:solidFill>
@@ -3003,8 +3003,8 @@
           <a:cs typeface="+mn-cs"/>
         </a:defRPr>
       </a:lvl2pPr>
-      <a:lvl3pPr marL="914400" algn="l" defTabSz="914400" rtl="0" eaLnBrk="1" latinLnBrk="0" hangingPunct="1">
-        <a:defRPr sz="1800" kern="1200">
+      <a:lvl3pPr marL="658368" algn="l" defTabSz="658368" rtl="0" eaLnBrk="1" latinLnBrk="0" hangingPunct="1">
+        <a:defRPr sz="1300" kern="1200">
           <a:solidFill>
             <a:schemeClr val="tx1"/>
           </a:solidFill>
@@ -3013,8 +3013,8 @@
           <a:cs typeface="+mn-cs"/>
         </a:defRPr>
       </a:lvl3pPr>
-      <a:lvl4pPr marL="1371600" algn="l" defTabSz="914400" rtl="0" eaLnBrk="1" latinLnBrk="0" hangingPunct="1">
-        <a:defRPr sz="1800" kern="1200">
+      <a:lvl4pPr marL="987552" algn="l" defTabSz="658368" rtl="0" eaLnBrk="1" latinLnBrk="0" hangingPunct="1">
+        <a:defRPr sz="1300" kern="1200">
           <a:solidFill>
             <a:schemeClr val="tx1"/>
           </a:solidFill>
@@ -3023,8 +3023,8 @@
           <a:cs typeface="+mn-cs"/>
         </a:defRPr>
       </a:lvl4pPr>
-      <a:lvl5pPr marL="1828800" algn="l" defTabSz="914400" rtl="0" eaLnBrk="1" latinLnBrk="0" hangingPunct="1">
-        <a:defRPr sz="1800" kern="1200">
+      <a:lvl5pPr marL="1316736" algn="l" defTabSz="658368" rtl="0" eaLnBrk="1" latinLnBrk="0" hangingPunct="1">
+        <a:defRPr sz="1300" kern="1200">
           <a:solidFill>
             <a:schemeClr val="tx1"/>
           </a:solidFill>
@@ -3033,8 +3033,8 @@
           <a:cs typeface="+mn-cs"/>
         </a:defRPr>
       </a:lvl5pPr>
-      <a:lvl6pPr marL="2286000" algn="l" defTabSz="914400" rtl="0" eaLnBrk="1" latinLnBrk="0" hangingPunct="1">
-        <a:defRPr sz="1800" kern="1200">
+      <a:lvl6pPr marL="1645920" algn="l" defTabSz="658368" rtl="0" eaLnBrk="1" latinLnBrk="0" hangingPunct="1">
+        <a:defRPr sz="1300" kern="1200">
           <a:solidFill>
             <a:schemeClr val="tx1"/>
           </a:solidFill>
@@ -3043,8 +3043,8 @@
           <a:cs typeface="+mn-cs"/>
         </a:defRPr>
       </a:lvl6pPr>
-      <a:lvl7pPr marL="2743200" algn="l" defTabSz="914400" rtl="0" eaLnBrk="1" latinLnBrk="0" hangingPunct="1">
-        <a:defRPr sz="1800" kern="1200">
+      <a:lvl7pPr marL="1975104" algn="l" defTabSz="658368" rtl="0" eaLnBrk="1" latinLnBrk="0" hangingPunct="1">
+        <a:defRPr sz="1300" kern="1200">
           <a:solidFill>
             <a:schemeClr val="tx1"/>
           </a:solidFill>
@@ -3053,8 +3053,8 @@
           <a:cs typeface="+mn-cs"/>
         </a:defRPr>
       </a:lvl7pPr>
-      <a:lvl8pPr marL="3200400" algn="l" defTabSz="914400" rtl="0" eaLnBrk="1" latinLnBrk="0" hangingPunct="1">
-        <a:defRPr sz="1800" kern="1200">
+      <a:lvl8pPr marL="2304288" algn="l" defTabSz="658368" rtl="0" eaLnBrk="1" latinLnBrk="0" hangingPunct="1">
+        <a:defRPr sz="1300" kern="1200">
           <a:solidFill>
             <a:schemeClr val="tx1"/>
           </a:solidFill>
@@ -3063,8 +3063,8 @@
           <a:cs typeface="+mn-cs"/>
         </a:defRPr>
       </a:lvl8pPr>
-      <a:lvl9pPr marL="3657600" algn="l" defTabSz="914400" rtl="0" eaLnBrk="1" latinLnBrk="0" hangingPunct="1">
-        <a:defRPr sz="1800" kern="1200">
+      <a:lvl9pPr marL="2633472" algn="l" defTabSz="658368" rtl="0" eaLnBrk="1" latinLnBrk="0" hangingPunct="1">
+        <a:defRPr sz="1300" kern="1200">
           <a:solidFill>
             <a:schemeClr val="tx1"/>
           </a:solidFill>
@@ -3097,92 +3097,213 @@
       </p:grpSpPr>
       <p:grpSp>
         <p:nvGrpSpPr>
-          <p:cNvPr id="6" name="Group 5"/>
-          <p:cNvGrpSpPr>
-            <a:grpSpLocks noChangeAspect="1"/>
-          </p:cNvGrpSpPr>
+          <p:cNvPr id="3" name="Group 2"/>
+          <p:cNvGrpSpPr/>
           <p:nvPr/>
         </p:nvGrpSpPr>
         <p:grpSpPr>
           <a:xfrm>
-            <a:off x="488152" y="220788"/>
-            <a:ext cx="2880000" cy="1681054"/>
-            <a:chOff x="1038225" y="1897810"/>
-            <a:chExt cx="3724276" cy="2173857"/>
+            <a:off x="42421" y="19015"/>
+            <a:ext cx="7287205" cy="4360340"/>
+            <a:chOff x="4134061" y="163770"/>
+            <a:chExt cx="7287205" cy="4360340"/>
           </a:xfrm>
         </p:grpSpPr>
+        <p:grpSp>
+          <p:nvGrpSpPr>
+            <p:cNvPr id="8" name="Group 7"/>
+            <p:cNvGrpSpPr>
+              <a:grpSpLocks noChangeAspect="1"/>
+            </p:cNvGrpSpPr>
+            <p:nvPr/>
+          </p:nvGrpSpPr>
+          <p:grpSpPr>
+            <a:xfrm>
+              <a:off x="4514709" y="163770"/>
+              <a:ext cx="2880000" cy="1681054"/>
+              <a:chOff x="1038225" y="1897810"/>
+              <a:chExt cx="3724276" cy="2173857"/>
+            </a:xfrm>
+          </p:grpSpPr>
+          <p:pic>
+            <p:nvPicPr>
+              <p:cNvPr id="9" name="Picture 3"/>
+              <p:cNvPicPr>
+                <a:picLocks noChangeAspect="1" noChangeArrowheads="1"/>
+              </p:cNvPicPr>
+              <p:nvPr/>
+            </p:nvPicPr>
+            <p:blipFill rotWithShape="1">
+              <a:blip r:embed="rId2" cstate="print">
+                <a:extLst>
+                  <a:ext uri="{28A0092B-C50C-407E-A947-70E740481C1C}">
+                    <a14:useLocalDpi xmlns:a14="http://schemas.microsoft.com/office/drawing/2010/main" val="0"/>
+                  </a:ext>
+                </a:extLst>
+              </a:blip>
+              <a:srcRect l="1714" t="16842" r="2460" b="7677"/>
+              <a:stretch/>
+            </p:blipFill>
+            <p:spPr bwMode="auto">
+              <a:xfrm>
+                <a:off x="1038225" y="1897810"/>
+                <a:ext cx="3724276" cy="2173857"/>
+              </a:xfrm>
+              <a:prstGeom prst="rect">
+                <a:avLst/>
+              </a:prstGeom>
+              <a:noFill/>
+              <a:ln>
+                <a:noFill/>
+              </a:ln>
+              <a:extLst>
+                <a:ext uri="{909E8E84-426E-40DD-AFC4-6F175D3DCCD1}">
+                  <a14:hiddenFill xmlns:a14="http://schemas.microsoft.com/office/drawing/2010/main">
+                    <a:solidFill>
+                      <a:schemeClr val="accent1"/>
+                    </a:solidFill>
+                  </a14:hiddenFill>
+                </a:ext>
+                <a:ext uri="{91240B29-F687-4F45-9708-019B960494DF}">
+                  <a14:hiddenLine xmlns:a14="http://schemas.microsoft.com/office/drawing/2010/main" w="9525">
+                    <a:solidFill>
+                      <a:schemeClr val="tx1"/>
+                    </a:solidFill>
+                    <a:miter lim="800000"/>
+                    <a:headEnd/>
+                    <a:tailEnd/>
+                  </a14:hiddenLine>
+                </a:ext>
+              </a:extLst>
+            </p:spPr>
+          </p:pic>
+          <p:sp>
+            <p:nvSpPr>
+              <p:cNvPr id="10" name="Rectangle 9"/>
+              <p:cNvSpPr/>
+              <p:nvPr/>
+            </p:nvSpPr>
+            <p:spPr>
+              <a:xfrm>
+                <a:off x="4427984" y="2152479"/>
+                <a:ext cx="334517" cy="270000"/>
+              </a:xfrm>
+              <a:prstGeom prst="rect">
+                <a:avLst/>
+              </a:prstGeom>
+              <a:solidFill>
+                <a:schemeClr val="bg1"/>
+              </a:solidFill>
+              <a:ln>
+                <a:noFill/>
+              </a:ln>
+            </p:spPr>
+            <p:style>
+              <a:lnRef idx="2">
+                <a:schemeClr val="accent1">
+                  <a:shade val="50000"/>
+                </a:schemeClr>
+              </a:lnRef>
+              <a:fillRef idx="1">
+                <a:schemeClr val="accent1"/>
+              </a:fillRef>
+              <a:effectRef idx="0">
+                <a:schemeClr val="accent1"/>
+              </a:effectRef>
+              <a:fontRef idx="minor">
+                <a:schemeClr val="lt1"/>
+              </a:fontRef>
+            </p:style>
+            <p:txBody>
+              <a:bodyPr rtlCol="0" anchor="ctr"/>
+              <a:lstStyle/>
+              <a:p>
+                <a:pPr algn="ctr"/>
+                <a:endParaRPr lang="de-DE"/>
+              </a:p>
+            </p:txBody>
+          </p:sp>
+        </p:grpSp>
         <p:pic>
           <p:nvPicPr>
-            <p:cNvPr id="1027" name="Picture 3"/>
+            <p:cNvPr id="11" name="Picture 5" descr="https://upload.wikimedia.org/wikipedia/commons/6/63/Typical_cnn.png"/>
             <p:cNvPicPr>
               <a:picLocks noChangeAspect="1" noChangeArrowheads="1"/>
             </p:cNvPicPr>
             <p:nvPr/>
           </p:nvPicPr>
-          <p:blipFill rotWithShape="1">
-            <a:blip r:embed="rId2" cstate="print">
+          <p:blipFill>
+            <a:blip r:embed="rId3">
+              <a:clrChange>
+                <a:clrFrom>
+                  <a:srgbClr val="FFFFFF"/>
+                </a:clrFrom>
+                <a:clrTo>
+                  <a:srgbClr val="FFFFFF">
+                    <a:alpha val="0"/>
+                  </a:srgbClr>
+                </a:clrTo>
+              </a:clrChange>
               <a:extLst>
                 <a:ext uri="{28A0092B-C50C-407E-A947-70E740481C1C}">
                   <a14:useLocalDpi xmlns:a14="http://schemas.microsoft.com/office/drawing/2010/main" val="0"/>
                 </a:ext>
               </a:extLst>
             </a:blip>
-            <a:srcRect l="1714" t="16842" r="2460" b="7677"/>
-            <a:stretch/>
+            <a:srcRect/>
+            <a:stretch>
+              <a:fillRect/>
+            </a:stretch>
           </p:blipFill>
           <p:spPr bwMode="auto">
             <a:xfrm>
-              <a:off x="1038225" y="1897810"/>
-              <a:ext cx="3724276" cy="2173857"/>
+              <a:off x="4166461" y="2291862"/>
+              <a:ext cx="7254805" cy="2232248"/>
             </a:xfrm>
             <a:prstGeom prst="rect">
               <a:avLst/>
             </a:prstGeom>
             <a:noFill/>
-            <a:ln>
-              <a:noFill/>
-            </a:ln>
             <a:extLst>
               <a:ext uri="{909E8E84-426E-40DD-AFC4-6F175D3DCCD1}">
                 <a14:hiddenFill xmlns:a14="http://schemas.microsoft.com/office/drawing/2010/main">
                   <a:solidFill>
-                    <a:schemeClr val="accent1"/>
+                    <a:srgbClr val="FFFFFF"/>
                   </a:solidFill>
                 </a14:hiddenFill>
-              </a:ext>
-              <a:ext uri="{91240B29-F687-4F45-9708-019B960494DF}">
-                <a14:hiddenLine xmlns:a14="http://schemas.microsoft.com/office/drawing/2010/main" w="9525">
-                  <a:solidFill>
-                    <a:schemeClr val="tx1"/>
-                  </a:solidFill>
-                  <a:miter lim="800000"/>
-                  <a:headEnd/>
-                  <a:tailEnd/>
-                </a14:hiddenLine>
               </a:ext>
             </a:extLst>
           </p:spPr>
         </p:pic>
         <p:sp>
           <p:nvSpPr>
-            <p:cNvPr id="5" name="Rectangle 4"/>
+            <p:cNvPr id="12" name="Trapezoid 11"/>
             <p:cNvSpPr/>
             <p:nvPr/>
           </p:nvSpPr>
           <p:spPr>
             <a:xfrm>
-              <a:off x="4427984" y="2152479"/>
-              <a:ext cx="334517" cy="270000"/>
+              <a:off x="4134061" y="1787806"/>
+              <a:ext cx="1584176" cy="1265619"/>
             </a:xfrm>
-            <a:prstGeom prst="rect">
-              <a:avLst/>
+            <a:prstGeom prst="trapezoid">
+              <a:avLst>
+                <a:gd name="adj" fmla="val 32225"/>
+              </a:avLst>
             </a:prstGeom>
-            <a:solidFill>
-              <a:schemeClr val="bg1"/>
-            </a:solidFill>
-            <a:ln>
-              <a:noFill/>
-            </a:ln>
+            <a:gradFill>
+              <a:gsLst>
+                <a:gs pos="0">
+                  <a:srgbClr val="63B3E0"/>
+                </a:gs>
+                <a:gs pos="100000">
+                  <a:srgbClr val="63B3E0">
+                    <a:alpha val="10000"/>
+                  </a:srgbClr>
+                </a:gs>
+              </a:gsLst>
+              <a:lin ang="5400000" scaled="0"/>
+            </a:gradFill>
           </p:spPr>
           <p:style>
             <a:lnRef idx="2">
@@ -3210,112 +3331,6 @@
           </p:txBody>
         </p:sp>
       </p:grpSp>
-      <p:pic>
-        <p:nvPicPr>
-          <p:cNvPr id="1029" name="Picture 5" descr="https://upload.wikimedia.org/wikipedia/commons/6/63/Typical_cnn.png"/>
-          <p:cNvPicPr>
-            <a:picLocks noChangeAspect="1" noChangeArrowheads="1"/>
-          </p:cNvPicPr>
-          <p:nvPr/>
-        </p:nvPicPr>
-        <p:blipFill>
-          <a:blip r:embed="rId3">
-            <a:clrChange>
-              <a:clrFrom>
-                <a:srgbClr val="FFFFFF"/>
-              </a:clrFrom>
-              <a:clrTo>
-                <a:srgbClr val="FFFFFF">
-                  <a:alpha val="0"/>
-                </a:srgbClr>
-              </a:clrTo>
-            </a:clrChange>
-            <a:extLst>
-              <a:ext uri="{28A0092B-C50C-407E-A947-70E740481C1C}">
-                <a14:useLocalDpi xmlns:a14="http://schemas.microsoft.com/office/drawing/2010/main" val="0"/>
-              </a:ext>
-            </a:extLst>
-          </a:blip>
-          <a:srcRect/>
-          <a:stretch>
-            <a:fillRect/>
-          </a:stretch>
-        </p:blipFill>
-        <p:spPr bwMode="auto">
-          <a:xfrm>
-            <a:off x="1928152" y="2132856"/>
-            <a:ext cx="7254805" cy="2232248"/>
-          </a:xfrm>
-          <a:prstGeom prst="rect">
-            <a:avLst/>
-          </a:prstGeom>
-          <a:noFill/>
-          <a:extLst>
-            <a:ext uri="{909E8E84-426E-40DD-AFC4-6F175D3DCCD1}">
-              <a14:hiddenFill xmlns:a14="http://schemas.microsoft.com/office/drawing/2010/main">
-                <a:solidFill>
-                  <a:srgbClr val="FFFFFF"/>
-                </a:solidFill>
-              </a14:hiddenFill>
-            </a:ext>
-          </a:extLst>
-        </p:spPr>
-      </p:pic>
-      <p:sp>
-        <p:nvSpPr>
-          <p:cNvPr id="7" name="Trapezoid 6"/>
-          <p:cNvSpPr/>
-          <p:nvPr/>
-        </p:nvSpPr>
-        <p:spPr>
-          <a:xfrm>
-            <a:off x="179512" y="2379405"/>
-            <a:ext cx="1584176" cy="1265619"/>
-          </a:xfrm>
-          <a:prstGeom prst="trapezoid">
-            <a:avLst>
-              <a:gd name="adj" fmla="val 32225"/>
-            </a:avLst>
-          </a:prstGeom>
-          <a:gradFill>
-            <a:gsLst>
-              <a:gs pos="0">
-                <a:srgbClr val="63B3E0"/>
-              </a:gs>
-              <a:gs pos="100000">
-                <a:srgbClr val="63B3E0">
-                  <a:alpha val="10000"/>
-                </a:srgbClr>
-              </a:gs>
-            </a:gsLst>
-            <a:lin ang="5400000" scaled="0"/>
-          </a:gradFill>
-        </p:spPr>
-        <p:style>
-          <a:lnRef idx="2">
-            <a:schemeClr val="accent1">
-              <a:shade val="50000"/>
-            </a:schemeClr>
-          </a:lnRef>
-          <a:fillRef idx="1">
-            <a:schemeClr val="accent1"/>
-          </a:fillRef>
-          <a:effectRef idx="0">
-            <a:schemeClr val="accent1"/>
-          </a:effectRef>
-          <a:fontRef idx="minor">
-            <a:schemeClr val="lt1"/>
-          </a:fontRef>
-        </p:style>
-        <p:txBody>
-          <a:bodyPr rtlCol="0" anchor="ctr"/>
-          <a:lstStyle/>
-          <a:p>
-            <a:pPr algn="ctr"/>
-            <a:endParaRPr lang="de-DE"/>
-          </a:p>
-        </p:txBody>
-      </p:sp>
     </p:spTree>
     <p:extLst>
       <p:ext uri="{BB962C8B-B14F-4D97-AF65-F5344CB8AC3E}">

</xml_diff>